<commit_message>
finished product from Dallas Day of .NET
</commit_message>
<xml_diff>
--- a/BuildYourOwnIoC/Build Your Own Ioc Container.pptx
+++ b/BuildYourOwnIoC/Build Your Own Ioc Container.pptx
@@ -5,20 +5,19 @@
     <p:sldMasterId id="2147483660" r:id="rId1"/>
   </p:sldMasterIdLst>
   <p:notesMasterIdLst>
-    <p:notesMasterId r:id="rId13"/>
+    <p:notesMasterId r:id="rId12"/>
   </p:notesMasterIdLst>
   <p:sldIdLst>
     <p:sldId id="256" r:id="rId2"/>
-    <p:sldId id="257" r:id="rId3"/>
-    <p:sldId id="258" r:id="rId4"/>
-    <p:sldId id="259" r:id="rId5"/>
-    <p:sldId id="260" r:id="rId6"/>
-    <p:sldId id="262" r:id="rId7"/>
-    <p:sldId id="263" r:id="rId8"/>
-    <p:sldId id="266" r:id="rId9"/>
-    <p:sldId id="264" r:id="rId10"/>
-    <p:sldId id="265" r:id="rId11"/>
-    <p:sldId id="267" r:id="rId12"/>
+    <p:sldId id="268" r:id="rId3"/>
+    <p:sldId id="257" r:id="rId4"/>
+    <p:sldId id="258" r:id="rId5"/>
+    <p:sldId id="259" r:id="rId6"/>
+    <p:sldId id="260" r:id="rId7"/>
+    <p:sldId id="269" r:id="rId8"/>
+    <p:sldId id="264" r:id="rId9"/>
+    <p:sldId id="265" r:id="rId10"/>
+    <p:sldId id="267" r:id="rId11"/>
   </p:sldIdLst>
   <p:sldSz cx="9144000" cy="6858000" type="screen4x3"/>
   <p:notesSz cx="6858000" cy="9144000"/>
@@ -202,7 +201,7 @@
           <a:p>
             <a:fld id="{EC34E648-8457-48F2-B6CA-95B1DA475DC5}" type="datetimeFigureOut">
               <a:rPr lang="en-US" smtClean="0"/>
-              <a:t>2/9/2011</a:t>
+              <a:t>3/4/2011</a:t>
             </a:fld>
             <a:endParaRPr lang="en-US"/>
           </a:p>
@@ -370,6 +369,11 @@
         </p:txBody>
       </p:sp>
     </p:spTree>
+    <p:extLst>
+      <p:ext uri="{BB962C8B-B14F-4D97-AF65-F5344CB8AC3E}">
+        <p14:creationId xmlns:p14="http://schemas.microsoft.com/office/powerpoint/2010/main" val="2995436811"/>
+      </p:ext>
+    </p:extLst>
   </p:cSld>
   <p:clrMap bg1="lt1" tx1="dk1" bg2="lt2" tx2="dk2" accent1="accent1" accent2="accent2" accent3="accent3" accent4="accent4" accent5="accent5" accent6="accent6" hlink="hlink" folHlink="folHlink"/>
   <p:notesStyle>
@@ -513,10 +517,6 @@
           </a:bodyPr>
           <a:lstStyle/>
           <a:p>
-            <a:r>
-              <a:rPr lang="en-US" dirty="0" smtClean="0"/>
-              <a:t>* this is subject to how the container chooses it’s constructor</a:t>
-            </a:r>
             <a:endParaRPr lang="en-US" dirty="0"/>
           </a:p>
         </p:txBody>
@@ -538,7 +538,7 @@
           <a:p>
             <a:fld id="{1512E563-3653-4A5F-B290-12242E9E7E0B}" type="slidenum">
               <a:rPr lang="en-US" smtClean="0"/>
-              <a:t>3</a:t>
+              <a:t>4</a:t>
             </a:fld>
             <a:endParaRPr lang="en-US"/>
           </a:p>
@@ -627,7 +627,7 @@
           <a:p>
             <a:fld id="{1512E563-3653-4A5F-B290-12242E9E7E0B}" type="slidenum">
               <a:rPr lang="en-US" smtClean="0"/>
-              <a:t>9</a:t>
+              <a:t>8</a:t>
             </a:fld>
             <a:endParaRPr lang="en-US"/>
           </a:p>
@@ -1025,7 +1025,7 @@
           <a:p>
             <a:fld id="{691F226E-D6F6-4011-BB9D-84620BFBE5B3}" type="datetimeFigureOut">
               <a:rPr lang="en-US" smtClean="0"/>
-              <a:t>2/9/2011</a:t>
+              <a:t>3/4/2011</a:t>
             </a:fld>
             <a:endParaRPr lang="en-US"/>
           </a:p>
@@ -1190,7 +1190,7 @@
           <a:p>
             <a:fld id="{691F226E-D6F6-4011-BB9D-84620BFBE5B3}" type="datetimeFigureOut">
               <a:rPr lang="en-US" smtClean="0"/>
-              <a:t>2/9/2011</a:t>
+              <a:t>3/4/2011</a:t>
             </a:fld>
             <a:endParaRPr lang="en-US"/>
           </a:p>
@@ -1365,7 +1365,7 @@
           <a:p>
             <a:fld id="{691F226E-D6F6-4011-BB9D-84620BFBE5B3}" type="datetimeFigureOut">
               <a:rPr lang="en-US" smtClean="0"/>
-              <a:t>2/9/2011</a:t>
+              <a:t>3/4/2011</a:t>
             </a:fld>
             <a:endParaRPr lang="en-US"/>
           </a:p>
@@ -1534,7 +1534,7 @@
           <a:p>
             <a:fld id="{691F226E-D6F6-4011-BB9D-84620BFBE5B3}" type="datetimeFigureOut">
               <a:rPr lang="en-US" smtClean="0"/>
-              <a:t>2/9/2011</a:t>
+              <a:t>3/4/2011</a:t>
             </a:fld>
             <a:endParaRPr lang="en-US"/>
           </a:p>
@@ -1989,7 +1989,7 @@
           <a:p>
             <a:fld id="{691F226E-D6F6-4011-BB9D-84620BFBE5B3}" type="datetimeFigureOut">
               <a:rPr lang="en-US" smtClean="0"/>
-              <a:t>2/9/2011</a:t>
+              <a:t>3/4/2011</a:t>
             </a:fld>
             <a:endParaRPr lang="en-US"/>
           </a:p>
@@ -2253,7 +2253,7 @@
           <a:p>
             <a:fld id="{691F226E-D6F6-4011-BB9D-84620BFBE5B3}" type="datetimeFigureOut">
               <a:rPr lang="en-US" smtClean="0"/>
-              <a:t>2/9/2011</a:t>
+              <a:t>3/4/2011</a:t>
             </a:fld>
             <a:endParaRPr lang="en-US"/>
           </a:p>
@@ -2627,7 +2627,7 @@
           <a:p>
             <a:fld id="{691F226E-D6F6-4011-BB9D-84620BFBE5B3}" type="datetimeFigureOut">
               <a:rPr lang="en-US" smtClean="0"/>
-              <a:t>2/9/2011</a:t>
+              <a:t>3/4/2011</a:t>
             </a:fld>
             <a:endParaRPr lang="en-US"/>
           </a:p>
@@ -2749,7 +2749,7 @@
           <a:p>
             <a:fld id="{691F226E-D6F6-4011-BB9D-84620BFBE5B3}" type="datetimeFigureOut">
               <a:rPr lang="en-US" smtClean="0"/>
-              <a:t>2/9/2011</a:t>
+              <a:t>3/4/2011</a:t>
             </a:fld>
             <a:endParaRPr lang="en-US"/>
           </a:p>
@@ -2839,7 +2839,7 @@
           <a:p>
             <a:fld id="{691F226E-D6F6-4011-BB9D-84620BFBE5B3}" type="datetimeFigureOut">
               <a:rPr lang="en-US" smtClean="0"/>
-              <a:t>2/9/2011</a:t>
+              <a:t>3/4/2011</a:t>
             </a:fld>
             <a:endParaRPr lang="en-US"/>
           </a:p>
@@ -3088,7 +3088,7 @@
           <a:p>
             <a:fld id="{691F226E-D6F6-4011-BB9D-84620BFBE5B3}" type="datetimeFigureOut">
               <a:rPr lang="en-US" smtClean="0"/>
-              <a:t>2/9/2011</a:t>
+              <a:t>3/4/2011</a:t>
             </a:fld>
             <a:endParaRPr lang="en-US"/>
           </a:p>
@@ -3347,7 +3347,7 @@
           <a:p>
             <a:fld id="{691F226E-D6F6-4011-BB9D-84620BFBE5B3}" type="datetimeFigureOut">
               <a:rPr lang="en-US" smtClean="0"/>
-              <a:t>2/9/2011</a:t>
+              <a:t>3/4/2011</a:t>
             </a:fld>
             <a:endParaRPr lang="en-US"/>
           </a:p>
@@ -3751,7 +3751,7 @@
           <a:p>
             <a:fld id="{691F226E-D6F6-4011-BB9D-84620BFBE5B3}" type="datetimeFigureOut">
               <a:rPr lang="en-US" smtClean="0"/>
-              <a:t>2/9/2011</a:t>
+              <a:t>3/4/2011</a:t>
             </a:fld>
             <a:endParaRPr lang="en-US"/>
           </a:p>
@@ -4198,8 +4198,20 @@
           <a:lstStyle/>
           <a:p>
             <a:r>
+              <a:rPr lang="en-US" dirty="0"/>
+              <a:t>B</a:t>
+            </a:r>
+            <a:r>
               <a:rPr lang="en-US" dirty="0" smtClean="0"/>
-              <a:t>Just because we can</a:t>
+              <a:t>ecause </a:t>
+            </a:r>
+            <a:r>
+              <a:rPr lang="en-US" dirty="0" smtClean="0"/>
+              <a:t>we </a:t>
+            </a:r>
+            <a:r>
+              <a:rPr lang="en-US" dirty="0" smtClean="0"/>
+              <a:t>can, not because we should.</a:t>
             </a:r>
             <a:endParaRPr lang="en-US" dirty="0"/>
           </a:p>
@@ -4242,110 +4254,6 @@
         </p:nvSpPr>
         <p:spPr/>
         <p:txBody>
-          <a:bodyPr/>
-          <a:lstStyle/>
-          <a:p>
-            <a:r>
-              <a:rPr lang="en-US" dirty="0" smtClean="0"/>
-              <a:t>Component Disposal (cont.)</a:t>
-            </a:r>
-            <a:endParaRPr lang="en-US" dirty="0"/>
-          </a:p>
-        </p:txBody>
-      </p:sp>
-      <p:sp>
-        <p:nvSpPr>
-          <p:cNvPr id="3" name="Content Placeholder 2"/>
-          <p:cNvSpPr>
-            <a:spLocks noGrp="1"/>
-          </p:cNvSpPr>
-          <p:nvPr>
-            <p:ph idx="1"/>
-          </p:nvPr>
-        </p:nvSpPr>
-        <p:spPr/>
-        <p:txBody>
-          <a:bodyPr/>
-          <a:lstStyle/>
-          <a:p>
-            <a:r>
-              <a:rPr lang="en-US" dirty="0" smtClean="0"/>
-              <a:t>Given that a Ninja was provided by an </a:t>
-            </a:r>
-            <a:r>
-              <a:rPr lang="en-US" dirty="0" err="1" smtClean="0"/>
-              <a:t>IoC</a:t>
-            </a:r>
-            <a:r>
-              <a:rPr lang="en-US" dirty="0" smtClean="0"/>
-              <a:t> container, how does it get disposed?</a:t>
-            </a:r>
-          </a:p>
-          <a:p>
-            <a:r>
-              <a:rPr lang="en-US" dirty="0" smtClean="0"/>
-              <a:t>Windsor provides a release method.</a:t>
-            </a:r>
-          </a:p>
-          <a:p>
-            <a:pPr lvl="1"/>
-            <a:r>
-              <a:rPr lang="en-US" dirty="0" smtClean="0"/>
-              <a:t>It keeps track of all the dependencies that were instantiated down the line and then walks it back, disposing of them as necessary.</a:t>
-            </a:r>
-          </a:p>
-          <a:p>
-            <a:r>
-              <a:rPr lang="en-US" dirty="0" err="1" smtClean="0"/>
-              <a:t>Autofac</a:t>
-            </a:r>
-            <a:r>
-              <a:rPr lang="en-US" dirty="0" smtClean="0"/>
-              <a:t> uses scopes to handle disposal.</a:t>
-            </a:r>
-          </a:p>
-          <a:p>
-            <a:endParaRPr lang="en-US" dirty="0"/>
-          </a:p>
-        </p:txBody>
-      </p:sp>
-    </p:spTree>
-  </p:cSld>
-  <p:clrMapOvr>
-    <a:masterClrMapping/>
-  </p:clrMapOvr>
-</p:sld>
-</file>
-
-<file path=ppt/slides/slide11.xml><?xml version="1.0" encoding="utf-8"?>
-<p:sld xmlns:a="http://schemas.openxmlformats.org/drawingml/2006/main" xmlns:r="http://schemas.openxmlformats.org/officeDocument/2006/relationships" xmlns:p="http://schemas.openxmlformats.org/presentationml/2006/main">
-  <p:cSld>
-    <p:spTree>
-      <p:nvGrpSpPr>
-        <p:cNvPr id="1" name=""/>
-        <p:cNvGrpSpPr/>
-        <p:nvPr/>
-      </p:nvGrpSpPr>
-      <p:grpSpPr>
-        <a:xfrm>
-          <a:off x="0" y="0"/>
-          <a:ext cx="0" cy="0"/>
-          <a:chOff x="0" y="0"/>
-          <a:chExt cx="0" cy="0"/>
-        </a:xfrm>
-      </p:grpSpPr>
-      <p:sp>
-        <p:nvSpPr>
-          <p:cNvPr id="2" name="Title 1"/>
-          <p:cNvSpPr>
-            <a:spLocks noGrp="1"/>
-          </p:cNvSpPr>
-          <p:nvPr>
-            <p:ph type="title"/>
-          </p:nvPr>
-        </p:nvSpPr>
-        <p:spPr/>
-        <p:txBody>
           <a:bodyPr>
             <a:normAutofit fontScale="90000"/>
           </a:bodyPr>
@@ -4431,70 +4339,88 @@
           <a:p>
             <a:r>
               <a:rPr lang="en-US" dirty="0" smtClean="0"/>
-              <a:t>What is </a:t>
-            </a:r>
-            <a:r>
-              <a:rPr lang="en-US" dirty="0" err="1" smtClean="0"/>
-              <a:t>IoC</a:t>
-            </a:r>
+              <a:t>Who is this guy?</a:t>
+            </a:r>
+            <a:endParaRPr lang="en-US" dirty="0"/>
+          </a:p>
+        </p:txBody>
+      </p:sp>
+      <p:sp>
+        <p:nvSpPr>
+          <p:cNvPr id="3" name="Content Placeholder 2"/>
+          <p:cNvSpPr>
+            <a:spLocks noGrp="1"/>
+          </p:cNvSpPr>
+          <p:nvPr>
+            <p:ph idx="1"/>
+          </p:nvPr>
+        </p:nvSpPr>
+        <p:spPr/>
+        <p:txBody>
+          <a:bodyPr/>
+          <a:lstStyle/>
+          <a:p>
             <a:r>
               <a:rPr lang="en-US" dirty="0" smtClean="0"/>
-              <a:t>?</a:t>
+              <a:t>Craig Wilson</a:t>
+            </a:r>
+          </a:p>
+          <a:p>
+            <a:r>
+              <a:rPr lang="en-US" dirty="0" smtClean="0"/>
+              <a:t>RBA Consulting</a:t>
             </a:r>
             <a:endParaRPr lang="en-US" dirty="0"/>
           </a:p>
         </p:txBody>
       </p:sp>
-      <p:sp>
-        <p:nvSpPr>
-          <p:cNvPr id="3" name="Content Placeholder 2"/>
-          <p:cNvSpPr>
-            <a:spLocks noGrp="1"/>
-          </p:cNvSpPr>
-          <p:nvPr>
-            <p:ph idx="1"/>
-          </p:nvPr>
-        </p:nvSpPr>
-        <p:spPr/>
-        <p:txBody>
-          <a:bodyPr>
-            <a:normAutofit/>
-          </a:bodyPr>
-          <a:lstStyle/>
-          <a:p>
-            <a:r>
-              <a:rPr lang="en-US" dirty="0" smtClean="0"/>
-              <a:t>An enabler of the D</a:t>
-            </a:r>
-          </a:p>
-          <a:p>
-            <a:pPr lvl="1"/>
-            <a:r>
-              <a:rPr lang="en-US" dirty="0" smtClean="0"/>
-              <a:t>Dependency Injection</a:t>
-            </a:r>
-          </a:p>
-          <a:p>
-            <a:r>
-              <a:rPr lang="en-US" dirty="0" smtClean="0"/>
-              <a:t>Move the responsibility of creating dependencies from a low-level component to a high-level component.</a:t>
-            </a:r>
-          </a:p>
-          <a:p>
-            <a:r>
-              <a:rPr lang="en-US" dirty="0" smtClean="0"/>
-              <a:t>Makes dependencies explicit and transparent as opposed to unknown and opaque</a:t>
-            </a:r>
-          </a:p>
-          <a:p>
-            <a:endParaRPr lang="en-US" dirty="0" smtClean="0"/>
-          </a:p>
-          <a:p>
-            <a:endParaRPr lang="en-US" dirty="0"/>
-          </a:p>
-        </p:txBody>
-      </p:sp>
+      <p:pic>
+        <p:nvPicPr>
+          <p:cNvPr id="1026" name="Picture 2" descr="C:\Users\craiggwilson\Desktop\rbalogo.gif"/>
+          <p:cNvPicPr>
+            <a:picLocks noChangeAspect="1" noChangeArrowheads="1"/>
+          </p:cNvPicPr>
+          <p:nvPr/>
+        </p:nvPicPr>
+        <p:blipFill>
+          <a:blip r:embed="rId2">
+            <a:extLst>
+              <a:ext uri="{28A0092B-C50C-407E-A947-70E740481C1C}">
+                <a14:useLocalDpi xmlns:a14="http://schemas.microsoft.com/office/drawing/2010/main" val="0"/>
+              </a:ext>
+            </a:extLst>
+          </a:blip>
+          <a:srcRect/>
+          <a:stretch>
+            <a:fillRect/>
+          </a:stretch>
+        </p:blipFill>
+        <p:spPr bwMode="auto">
+          <a:xfrm>
+            <a:off x="1447800" y="3200400"/>
+            <a:ext cx="2924175" cy="895350"/>
+          </a:xfrm>
+          <a:prstGeom prst="rect">
+            <a:avLst/>
+          </a:prstGeom>
+          <a:noFill/>
+          <a:extLst>
+            <a:ext uri="{909E8E84-426E-40DD-AFC4-6F175D3DCCD1}">
+              <a14:hiddenFill xmlns:a14="http://schemas.microsoft.com/office/drawing/2010/main">
+                <a:solidFill>
+                  <a:srgbClr val="FFFFFF"/>
+                </a:solidFill>
+              </a14:hiddenFill>
+            </a:ext>
+          </a:extLst>
+        </p:spPr>
+      </p:pic>
     </p:spTree>
+    <p:extLst>
+      <p:ext uri="{BB962C8B-B14F-4D97-AF65-F5344CB8AC3E}">
+        <p14:creationId xmlns:p14="http://schemas.microsoft.com/office/powerpoint/2010/main" val="635266147"/>
+      </p:ext>
+    </p:extLst>
   </p:cSld>
   <p:clrMapOvr>
     <a:masterClrMapping/>
@@ -4531,87 +4457,80 @@
         </p:nvSpPr>
         <p:spPr/>
         <p:txBody>
+          <a:bodyPr/>
+          <a:lstStyle/>
+          <a:p>
+            <a:r>
+              <a:rPr lang="en-US" dirty="0" smtClean="0"/>
+              <a:t>What is </a:t>
+            </a:r>
+            <a:r>
+              <a:rPr lang="en-US" dirty="0" err="1" smtClean="0"/>
+              <a:t>IoC</a:t>
+            </a:r>
+            <a:r>
+              <a:rPr lang="en-US" dirty="0" smtClean="0"/>
+              <a:t>?</a:t>
+            </a:r>
+            <a:endParaRPr lang="en-US" dirty="0"/>
+          </a:p>
+        </p:txBody>
+      </p:sp>
+      <p:sp>
+        <p:nvSpPr>
+          <p:cNvPr id="3" name="Content Placeholder 2"/>
+          <p:cNvSpPr>
+            <a:spLocks noGrp="1"/>
+          </p:cNvSpPr>
+          <p:nvPr>
+            <p:ph idx="1"/>
+          </p:nvPr>
+        </p:nvSpPr>
+        <p:spPr/>
+        <p:txBody>
           <a:bodyPr>
-            <a:normAutofit fontScale="90000"/>
+            <a:normAutofit/>
           </a:bodyPr>
           <a:lstStyle/>
           <a:p>
             <a:r>
               <a:rPr lang="en-US" dirty="0" smtClean="0"/>
-              <a:t>Types of Dependency Injection</a:t>
-            </a:r>
+              <a:t>An enabler of the </a:t>
+            </a:r>
+            <a:r>
+              <a:rPr lang="en-US" dirty="0" smtClean="0"/>
+              <a:t>D in SOLID</a:t>
+            </a:r>
+            <a:endParaRPr lang="en-US" dirty="0" smtClean="0"/>
+          </a:p>
+          <a:p>
+            <a:pPr lvl="1"/>
+            <a:r>
+              <a:rPr lang="en-US" dirty="0" smtClean="0"/>
+              <a:t>Dependency Injection</a:t>
+            </a:r>
+          </a:p>
+          <a:p>
+            <a:r>
+              <a:rPr lang="en-US" dirty="0" smtClean="0"/>
+              <a:t>Moves </a:t>
+            </a:r>
+            <a:r>
+              <a:rPr lang="en-US" dirty="0" smtClean="0"/>
+              <a:t>the responsibility of creating dependencies from a low-level component to a high-level component.</a:t>
+            </a:r>
+          </a:p>
+          <a:p>
+            <a:r>
+              <a:rPr lang="en-US" dirty="0" smtClean="0"/>
+              <a:t>Makes dependencies explicit and transparent as opposed to unknown and opaque</a:t>
+            </a:r>
+          </a:p>
+          <a:p>
+            <a:endParaRPr lang="en-US" dirty="0" smtClean="0"/>
+          </a:p>
+          <a:p>
             <a:endParaRPr lang="en-US" dirty="0"/>
-          </a:p>
-        </p:txBody>
-      </p:sp>
-      <p:sp>
-        <p:nvSpPr>
-          <p:cNvPr id="3" name="Content Placeholder 2"/>
-          <p:cNvSpPr>
-            <a:spLocks noGrp="1"/>
-          </p:cNvSpPr>
-          <p:nvPr>
-            <p:ph idx="1"/>
-          </p:nvPr>
-        </p:nvSpPr>
-        <p:spPr/>
-        <p:txBody>
-          <a:bodyPr>
-            <a:normAutofit lnSpcReduction="10000"/>
-          </a:bodyPr>
-          <a:lstStyle/>
-          <a:p>
-            <a:r>
-              <a:rPr lang="en-US" dirty="0" smtClean="0"/>
-              <a:t>Constructor Injection</a:t>
-            </a:r>
-          </a:p>
-          <a:p>
-            <a:pPr lvl="1"/>
-            <a:r>
-              <a:rPr lang="en-US" dirty="0" smtClean="0"/>
-              <a:t>Dependencies are passed in through the constructor.</a:t>
-            </a:r>
-          </a:p>
-          <a:p>
-            <a:pPr lvl="1"/>
-            <a:r>
-              <a:rPr lang="en-US" dirty="0" smtClean="0"/>
-              <a:t>This is useful for required dependencies</a:t>
-            </a:r>
-          </a:p>
-          <a:p>
-            <a:pPr lvl="1"/>
-            <a:r>
-              <a:rPr lang="en-US" dirty="0" smtClean="0"/>
-              <a:t>Default implementations can be provided for when not using a </a:t>
-            </a:r>
-            <a:r>
-              <a:rPr lang="en-US" dirty="0" smtClean="0"/>
-              <a:t>container*</a:t>
-            </a:r>
-            <a:endParaRPr lang="en-US" dirty="0" smtClean="0"/>
-          </a:p>
-          <a:p>
-            <a:r>
-              <a:rPr lang="en-US" dirty="0" smtClean="0"/>
-              <a:t>Property Injection</a:t>
-            </a:r>
-          </a:p>
-          <a:p>
-            <a:pPr lvl="1"/>
-            <a:r>
-              <a:rPr lang="en-US" dirty="0" smtClean="0"/>
-              <a:t>Dependencies are passed in through properties.</a:t>
-            </a:r>
-            <a:endParaRPr lang="en-US" dirty="0" smtClean="0"/>
-          </a:p>
-          <a:p>
-            <a:pPr lvl="1"/>
-            <a:r>
-              <a:rPr lang="en-US" dirty="0" smtClean="0"/>
-              <a:t>Useful for non-required dependencies.</a:t>
-            </a:r>
           </a:p>
         </p:txBody>
       </p:sp>
@@ -4652,12 +4571,14 @@
         </p:nvSpPr>
         <p:spPr/>
         <p:txBody>
-          <a:bodyPr/>
+          <a:bodyPr>
+            <a:normAutofit fontScale="90000"/>
+          </a:bodyPr>
           <a:lstStyle/>
           <a:p>
             <a:r>
               <a:rPr lang="en-US" dirty="0" smtClean="0"/>
-              <a:t>Why Build My Own?</a:t>
+              <a:t>Types of Dependency Injection</a:t>
             </a:r>
             <a:endParaRPr lang="en-US" dirty="0"/>
           </a:p>
@@ -4676,67 +4597,52 @@
         <p:spPr/>
         <p:txBody>
           <a:bodyPr>
-            <a:normAutofit lnSpcReduction="10000"/>
+            <a:normAutofit/>
           </a:bodyPr>
           <a:lstStyle/>
           <a:p>
             <a:r>
               <a:rPr lang="en-US" dirty="0" smtClean="0"/>
-              <a:t>I suffer from NIH</a:t>
-            </a:r>
-          </a:p>
-          <a:p>
+              <a:t>Constructor Injection</a:t>
+            </a:r>
+          </a:p>
+          <a:p>
+            <a:pPr lvl="1"/>
             <a:r>
               <a:rPr lang="en-US" dirty="0" smtClean="0"/>
-              <a:t>I want to know how something works</a:t>
-            </a:r>
-          </a:p>
-          <a:p>
+              <a:t>Dependencies are passed in through the constructor.</a:t>
+            </a:r>
+          </a:p>
+          <a:p>
+            <a:pPr lvl="1"/>
             <a:r>
               <a:rPr lang="en-US" dirty="0" smtClean="0"/>
-              <a:t>I find it is easier to explain if I have built something myself</a:t>
-            </a:r>
-          </a:p>
-          <a:p>
-            <a:endParaRPr lang="en-US" dirty="0" smtClean="0"/>
+              <a:t>This is useful for required dependencies</a:t>
+            </a:r>
           </a:p>
           <a:p>
             <a:r>
               <a:rPr lang="en-US" dirty="0" smtClean="0"/>
-              <a:t>This is not for use in production systems…</a:t>
+              <a:t>Property </a:t>
+            </a:r>
+            <a:r>
+              <a:rPr lang="en-US" dirty="0" smtClean="0"/>
+              <a:t>Injection</a:t>
             </a:r>
           </a:p>
           <a:p>
             <a:pPr lvl="1"/>
             <a:r>
               <a:rPr lang="en-US" dirty="0" smtClean="0"/>
-              <a:t>Pick one of the big guys: </a:t>
-            </a:r>
-            <a:r>
-              <a:rPr lang="en-US" dirty="0" err="1" smtClean="0"/>
-              <a:t>Autofac</a:t>
-            </a:r>
+              <a:t>Dependencies are passed in through properties.</a:t>
+            </a:r>
+          </a:p>
+          <a:p>
+            <a:pPr lvl="1"/>
             <a:r>
               <a:rPr lang="en-US" dirty="0" smtClean="0"/>
-              <a:t>, Windsor, </a:t>
-            </a:r>
-            <a:r>
-              <a:rPr lang="en-US" dirty="0" err="1" smtClean="0"/>
-              <a:t>Ninject</a:t>
-            </a:r>
-            <a:r>
-              <a:rPr lang="en-US" dirty="0" smtClean="0"/>
-              <a:t>, </a:t>
-            </a:r>
-            <a:r>
-              <a:rPr lang="en-US" dirty="0" err="1" smtClean="0"/>
-              <a:t>StructureMap</a:t>
-            </a:r>
-            <a:r>
-              <a:rPr lang="en-US" dirty="0" smtClean="0"/>
-              <a:t>, Unity</a:t>
-            </a:r>
-            <a:endParaRPr lang="en-US" dirty="0"/>
+              <a:t>Useful for non-required dependencies.</a:t>
+            </a:r>
           </a:p>
         </p:txBody>
       </p:sp>
@@ -4782,7 +4688,7 @@
           <a:p>
             <a:r>
               <a:rPr lang="en-US" dirty="0" smtClean="0"/>
-              <a:t>Coding Goal #1</a:t>
+              <a:t>Why Build My Own?</a:t>
             </a:r>
             <a:endParaRPr lang="en-US" dirty="0"/>
           </a:p>
@@ -4800,41 +4706,68 @@
         </p:nvSpPr>
         <p:spPr/>
         <p:txBody>
-          <a:bodyPr/>
-          <a:lstStyle/>
-          <a:p>
-            <a:pPr marL="660654" indent="-514350"/>
+          <a:bodyPr>
+            <a:normAutofit lnSpcReduction="10000"/>
+          </a:bodyPr>
+          <a:lstStyle/>
+          <a:p>
             <a:r>
               <a:rPr lang="en-US" dirty="0" smtClean="0"/>
-              <a:t>Given a type, give me back an instance of that type.</a:t>
-            </a:r>
-          </a:p>
-          <a:p>
-            <a:pPr marL="962406" lvl="1" indent="-514350"/>
+              <a:t>I suffer from NIH</a:t>
+            </a:r>
+          </a:p>
+          <a:p>
             <a:r>
               <a:rPr lang="en-US" dirty="0" smtClean="0"/>
-              <a:t>Registered instances</a:t>
-            </a:r>
-          </a:p>
-          <a:p>
-            <a:pPr marL="962406" lvl="1" indent="-514350"/>
+              <a:t>I want to know how something works</a:t>
+            </a:r>
+          </a:p>
+          <a:p>
             <a:r>
               <a:rPr lang="en-US" dirty="0" smtClean="0"/>
-              <a:t>Non-registered instances</a:t>
-            </a:r>
-          </a:p>
-          <a:p>
-            <a:pPr marL="962406" lvl="1" indent="-514350"/>
+              <a:t>I find it is easier to explain if I have built something myself</a:t>
+            </a:r>
+          </a:p>
+          <a:p>
+            <a:endParaRPr lang="en-US" dirty="0" smtClean="0"/>
+          </a:p>
+          <a:p>
             <a:r>
               <a:rPr lang="en-US" dirty="0" smtClean="0"/>
-              <a:t>Instances with dependencies</a:t>
-            </a:r>
-          </a:p>
-          <a:p>
-            <a:pPr marL="962406" lvl="1" indent="-514350">
-              <a:buNone/>
-            </a:pPr>
-            <a:endParaRPr lang="en-US" dirty="0" smtClean="0"/>
+              <a:t>This is not for use in production systems…</a:t>
+            </a:r>
+          </a:p>
+          <a:p>
+            <a:pPr lvl="1"/>
+            <a:r>
+              <a:rPr lang="en-US" dirty="0" smtClean="0"/>
+              <a:t>Pick one of the big guys: </a:t>
+            </a:r>
+            <a:r>
+              <a:rPr lang="en-US" dirty="0" err="1" smtClean="0"/>
+              <a:t>Autofac</a:t>
+            </a:r>
+            <a:r>
+              <a:rPr lang="en-US" dirty="0" smtClean="0"/>
+              <a:t>, Windsor, </a:t>
+            </a:r>
+            <a:r>
+              <a:rPr lang="en-US" dirty="0" err="1" smtClean="0"/>
+              <a:t>Ninject</a:t>
+            </a:r>
+            <a:r>
+              <a:rPr lang="en-US" dirty="0" smtClean="0"/>
+              <a:t>, </a:t>
+            </a:r>
+            <a:r>
+              <a:rPr lang="en-US" dirty="0" err="1" smtClean="0"/>
+              <a:t>StructureMap</a:t>
+            </a:r>
+            <a:r>
+              <a:rPr lang="en-US" dirty="0" smtClean="0"/>
+              <a:t>, Unity</a:t>
+            </a:r>
+            <a:endParaRPr lang="en-US" dirty="0"/>
           </a:p>
         </p:txBody>
       </p:sp>
@@ -4880,7 +4813,11 @@
           <a:p>
             <a:r>
               <a:rPr lang="en-US" dirty="0" smtClean="0"/>
-              <a:t>Coding Goal #2</a:t>
+              <a:t>Coding </a:t>
+            </a:r>
+            <a:r>
+              <a:rPr lang="en-US" dirty="0" smtClean="0"/>
+              <a:t>Goal</a:t>
             </a:r>
             <a:endParaRPr lang="en-US" dirty="0"/>
           </a:p>
@@ -4901,22 +4838,47 @@
           <a:bodyPr/>
           <a:lstStyle/>
           <a:p>
+            <a:pPr marL="660654" indent="-514350"/>
             <a:r>
               <a:rPr lang="en-US" dirty="0" smtClean="0"/>
-              <a:t>I want my component to always resolve to the same instance (Singleton)</a:t>
-            </a:r>
-          </a:p>
-          <a:p>
+              <a:t>Activation</a:t>
+            </a:r>
+          </a:p>
+          <a:p>
+            <a:pPr marL="962406" lvl="1" indent="-514350"/>
             <a:r>
               <a:rPr lang="en-US" dirty="0" smtClean="0"/>
-              <a:t>I want my component to always resolve to a new instance (Transient)</a:t>
-            </a:r>
-          </a:p>
-          <a:p>
+              <a:t>Dependencies</a:t>
+            </a:r>
+          </a:p>
+          <a:p>
+            <a:pPr marL="660654" indent="-514350"/>
             <a:r>
               <a:rPr lang="en-US" dirty="0" smtClean="0"/>
-              <a:t>I want my component to …</a:t>
-            </a:r>
+              <a:t>Lifetimes</a:t>
+            </a:r>
+          </a:p>
+          <a:p>
+            <a:pPr marL="962406" lvl="1" indent="-514350"/>
+            <a:r>
+              <a:rPr lang="en-US" dirty="0" smtClean="0"/>
+              <a:t>Transient</a:t>
+            </a:r>
+          </a:p>
+          <a:p>
+            <a:pPr marL="962406" lvl="1" indent="-514350"/>
+            <a:r>
+              <a:rPr lang="en-US" dirty="0" smtClean="0"/>
+              <a:t>Singleton</a:t>
+            </a:r>
+          </a:p>
+          <a:p>
+            <a:pPr marL="660654" indent="-514350"/>
+            <a:r>
+              <a:rPr lang="en-US" dirty="0" smtClean="0"/>
+              <a:t>Circular Dependencies</a:t>
+            </a:r>
+            <a:endParaRPr lang="en-US" dirty="0" smtClean="0"/>
           </a:p>
         </p:txBody>
       </p:sp>
@@ -4947,7 +4909,7 @@
       </p:grpSpPr>
       <p:sp>
         <p:nvSpPr>
-          <p:cNvPr id="2" name="Title 1"/>
+          <p:cNvPr id="4" name="Title 3"/>
           <p:cNvSpPr>
             <a:spLocks noGrp="1"/>
           </p:cNvSpPr>
@@ -4957,14 +4919,12 @@
         </p:nvSpPr>
         <p:spPr/>
         <p:txBody>
-          <a:bodyPr>
-            <a:normAutofit/>
-          </a:bodyPr>
+          <a:bodyPr/>
           <a:lstStyle/>
           <a:p>
             <a:r>
               <a:rPr lang="en-US" dirty="0" smtClean="0"/>
-              <a:t>Coding Goal #3</a:t>
+              <a:t>Let’s code</a:t>
             </a:r>
             <a:endParaRPr lang="en-US" dirty="0"/>
           </a:p>
@@ -4972,12 +4932,12 @@
       </p:sp>
       <p:sp>
         <p:nvSpPr>
-          <p:cNvPr id="3" name="Content Placeholder 2"/>
-          <p:cNvSpPr>
-            <a:spLocks noGrp="1"/>
-          </p:cNvSpPr>
-          <p:nvPr>
-            <p:ph idx="1"/>
+          <p:cNvPr id="5" name="Text Placeholder 4"/>
+          <p:cNvSpPr>
+            <a:spLocks noGrp="1"/>
+          </p:cNvSpPr>
+          <p:nvPr>
+            <p:ph type="body" idx="1"/>
           </p:nvPr>
         </p:nvSpPr>
         <p:spPr/>
@@ -4985,22 +4945,16 @@
           <a:bodyPr/>
           <a:lstStyle/>
           <a:p>
-            <a:r>
-              <a:rPr lang="en-US" dirty="0" smtClean="0"/>
-              <a:t>Lifetime and Activation are 2 different things.</a:t>
-            </a:r>
-          </a:p>
-          <a:p>
-            <a:pPr lvl="1"/>
-            <a:r>
-              <a:rPr lang="en-US" dirty="0" smtClean="0"/>
-              <a:t>What if a component desired as a singleton isn’t provided as an instance?</a:t>
-            </a:r>
-            <a:endParaRPr lang="en-US" dirty="0"/>
+            <a:endParaRPr lang="en-US"/>
           </a:p>
         </p:txBody>
       </p:sp>
     </p:spTree>
+    <p:extLst>
+      <p:ext uri="{BB962C8B-B14F-4D97-AF65-F5344CB8AC3E}">
+        <p14:creationId xmlns:p14="http://schemas.microsoft.com/office/powerpoint/2010/main" val="671246246"/>
+      </p:ext>
+    </p:extLst>
   </p:cSld>
   <p:clrMapOvr>
     <a:masterClrMapping/>
@@ -5042,7 +4996,7 @@
           <a:p>
             <a:r>
               <a:rPr lang="en-US" dirty="0" smtClean="0"/>
-              <a:t>Coding Goal #4</a:t>
+              <a:t>Component Disposal</a:t>
             </a:r>
             <a:endParaRPr lang="en-US" dirty="0"/>
           </a:p>
@@ -5058,16 +5012,254 @@
             <p:ph idx="1"/>
           </p:nvPr>
         </p:nvSpPr>
-        <p:spPr/>
-        <p:txBody>
-          <a:bodyPr/>
+        <p:spPr>
+          <a:xfrm>
+            <a:off x="457200" y="1600200"/>
+            <a:ext cx="8305800" cy="4525963"/>
+          </a:xfrm>
+        </p:spPr>
+        <p:txBody>
+          <a:bodyPr>
+            <a:normAutofit/>
+          </a:bodyPr>
           <a:lstStyle/>
           <a:p>
             <a:r>
               <a:rPr lang="en-US" dirty="0" smtClean="0"/>
-              <a:t>I should not get a stack overflow if I have cycles in my dependency chain.</a:t>
-            </a:r>
-            <a:endParaRPr lang="en-US" dirty="0"/>
+              <a:t>This is hard.</a:t>
+            </a:r>
+          </a:p>
+          <a:p>
+            <a:r>
+              <a:rPr lang="en-US" dirty="0" smtClean="0"/>
+              <a:t>Rule of disposal</a:t>
+            </a:r>
+          </a:p>
+          <a:p>
+            <a:pPr lvl="1"/>
+            <a:r>
+              <a:rPr lang="en-US" dirty="0" smtClean="0"/>
+              <a:t> implement </a:t>
+            </a:r>
+            <a:r>
+              <a:rPr lang="en-US" dirty="0" err="1" smtClean="0"/>
+              <a:t>IDisposable</a:t>
+            </a:r>
+            <a:r>
+              <a:rPr lang="en-US" dirty="0" smtClean="0"/>
+              <a:t> when the class </a:t>
+            </a:r>
+            <a:r>
+              <a:rPr lang="en-US" b="1" i="1" u="sng" dirty="0" smtClean="0"/>
+              <a:t>owns</a:t>
+            </a:r>
+            <a:r>
+              <a:rPr lang="en-US" dirty="0" smtClean="0"/>
+              <a:t> an unmanaged resource and/or another class that implements </a:t>
+            </a:r>
+            <a:r>
+              <a:rPr lang="en-US" dirty="0" err="1" smtClean="0"/>
+              <a:t>IDisposable</a:t>
+            </a:r>
+            <a:r>
+              <a:rPr lang="en-US" dirty="0" smtClean="0"/>
+              <a:t>.</a:t>
+            </a:r>
+          </a:p>
+          <a:p>
+            <a:pPr lvl="1"/>
+            <a:endParaRPr lang="en-US" dirty="0" smtClean="0"/>
+          </a:p>
+          <a:p>
+            <a:pPr lvl="1"/>
+            <a:endParaRPr lang="en-US" dirty="0" smtClean="0"/>
+          </a:p>
+        </p:txBody>
+      </p:sp>
+      <p:sp>
+        <p:nvSpPr>
+          <p:cNvPr id="4" name="TextBox 3"/>
+          <p:cNvSpPr txBox="1"/>
+          <p:nvPr/>
+        </p:nvSpPr>
+        <p:spPr>
+          <a:xfrm>
+            <a:off x="533400" y="4191000"/>
+            <a:ext cx="4191000" cy="2062103"/>
+          </a:xfrm>
+          <a:prstGeom prst="rect">
+            <a:avLst/>
+          </a:prstGeom>
+          <a:noFill/>
+        </p:spPr>
+        <p:txBody>
+          <a:bodyPr wrap="square" rtlCol="0">
+            <a:spAutoFit/>
+          </a:bodyPr>
+          <a:lstStyle/>
+          <a:p>
+            <a:r>
+              <a:rPr lang="en-US" sz="1600" dirty="0" smtClean="0">
+                <a:latin typeface="Consolas" pitchFamily="49" charset="0"/>
+                <a:cs typeface="Consolas" pitchFamily="49" charset="0"/>
+              </a:rPr>
+              <a:t>public class Ninja</a:t>
+            </a:r>
+          </a:p>
+          <a:p>
+            <a:r>
+              <a:rPr lang="en-US" sz="1600" dirty="0" smtClean="0">
+                <a:latin typeface="Consolas" pitchFamily="49" charset="0"/>
+                <a:cs typeface="Consolas" pitchFamily="49" charset="0"/>
+              </a:rPr>
+              <a:t>{</a:t>
+            </a:r>
+          </a:p>
+          <a:p>
+            <a:r>
+              <a:rPr lang="en-US" sz="1600" dirty="0" smtClean="0">
+                <a:latin typeface="Consolas" pitchFamily="49" charset="0"/>
+                <a:cs typeface="Consolas" pitchFamily="49" charset="0"/>
+              </a:rPr>
+              <a:t>  private Pirate _prisoner;</a:t>
+            </a:r>
+          </a:p>
+          <a:p>
+            <a:r>
+              <a:rPr lang="en-US" sz="1600" dirty="0" smtClean="0">
+                <a:latin typeface="Consolas" pitchFamily="49" charset="0"/>
+                <a:cs typeface="Consolas" pitchFamily="49" charset="0"/>
+              </a:rPr>
+              <a:t>  public Ninja(Pirate prisoner) </a:t>
+            </a:r>
+          </a:p>
+          <a:p>
+            <a:r>
+              <a:rPr lang="en-US" sz="1600" dirty="0" smtClean="0">
+                <a:latin typeface="Consolas" pitchFamily="49" charset="0"/>
+                <a:cs typeface="Consolas" pitchFamily="49" charset="0"/>
+              </a:rPr>
+              <a:t>  {</a:t>
+            </a:r>
+          </a:p>
+          <a:p>
+            <a:r>
+              <a:rPr lang="en-US" sz="1600" dirty="0" smtClean="0">
+                <a:latin typeface="Consolas" pitchFamily="49" charset="0"/>
+                <a:cs typeface="Consolas" pitchFamily="49" charset="0"/>
+              </a:rPr>
+              <a:t>     _prisoner = prisoner;</a:t>
+            </a:r>
+            <a:endParaRPr lang="en-US" sz="1600" dirty="0">
+              <a:latin typeface="Consolas" pitchFamily="49" charset="0"/>
+              <a:cs typeface="Consolas" pitchFamily="49" charset="0"/>
+            </a:endParaRPr>
+          </a:p>
+          <a:p>
+            <a:r>
+              <a:rPr lang="en-US" sz="1600" dirty="0">
+                <a:latin typeface="Consolas" pitchFamily="49" charset="0"/>
+                <a:cs typeface="Consolas" pitchFamily="49" charset="0"/>
+              </a:rPr>
+              <a:t> </a:t>
+            </a:r>
+            <a:r>
+              <a:rPr lang="en-US" sz="1600" dirty="0" smtClean="0">
+                <a:latin typeface="Consolas" pitchFamily="49" charset="0"/>
+                <a:cs typeface="Consolas" pitchFamily="49" charset="0"/>
+              </a:rPr>
+              <a:t> }</a:t>
+            </a:r>
+          </a:p>
+          <a:p>
+            <a:r>
+              <a:rPr lang="en-US" sz="1600" dirty="0">
+                <a:latin typeface="Consolas" pitchFamily="49" charset="0"/>
+                <a:cs typeface="Consolas" pitchFamily="49" charset="0"/>
+              </a:rPr>
+              <a:t>}</a:t>
+            </a:r>
+          </a:p>
+        </p:txBody>
+      </p:sp>
+      <p:sp>
+        <p:nvSpPr>
+          <p:cNvPr id="5" name="TextBox 4"/>
+          <p:cNvSpPr txBox="1"/>
+          <p:nvPr/>
+        </p:nvSpPr>
+        <p:spPr>
+          <a:xfrm>
+            <a:off x="4419600" y="4191000"/>
+            <a:ext cx="4191000" cy="1077218"/>
+          </a:xfrm>
+          <a:prstGeom prst="rect">
+            <a:avLst/>
+          </a:prstGeom>
+          <a:noFill/>
+        </p:spPr>
+        <p:txBody>
+          <a:bodyPr wrap="square" rtlCol="0">
+            <a:spAutoFit/>
+          </a:bodyPr>
+          <a:lstStyle/>
+          <a:p>
+            <a:r>
+              <a:rPr lang="en-US" sz="1600" dirty="0" smtClean="0">
+                <a:latin typeface="Consolas" pitchFamily="49" charset="0"/>
+                <a:cs typeface="Consolas" pitchFamily="49" charset="0"/>
+              </a:rPr>
+              <a:t>public class Pirate : </a:t>
+            </a:r>
+            <a:r>
+              <a:rPr lang="en-US" sz="1600" dirty="0" err="1" smtClean="0">
+                <a:latin typeface="Consolas" pitchFamily="49" charset="0"/>
+                <a:cs typeface="Consolas" pitchFamily="49" charset="0"/>
+              </a:rPr>
+              <a:t>IDisposable</a:t>
+            </a:r>
+            <a:endParaRPr lang="en-US" sz="1600" dirty="0" smtClean="0">
+              <a:latin typeface="Consolas" pitchFamily="49" charset="0"/>
+              <a:cs typeface="Consolas" pitchFamily="49" charset="0"/>
+            </a:endParaRPr>
+          </a:p>
+          <a:p>
+            <a:r>
+              <a:rPr lang="en-US" sz="1600" dirty="0" smtClean="0">
+                <a:latin typeface="Consolas" pitchFamily="49" charset="0"/>
+                <a:cs typeface="Consolas" pitchFamily="49" charset="0"/>
+              </a:rPr>
+              <a:t>{</a:t>
+            </a:r>
+          </a:p>
+          <a:p>
+            <a:r>
+              <a:rPr lang="en-US" sz="1600" dirty="0">
+                <a:latin typeface="Consolas" pitchFamily="49" charset="0"/>
+                <a:cs typeface="Consolas" pitchFamily="49" charset="0"/>
+              </a:rPr>
+              <a:t> </a:t>
+            </a:r>
+            <a:r>
+              <a:rPr lang="en-US" sz="1600" dirty="0" smtClean="0">
+                <a:latin typeface="Consolas" pitchFamily="49" charset="0"/>
+                <a:cs typeface="Consolas" pitchFamily="49" charset="0"/>
+              </a:rPr>
+              <a:t> //…</a:t>
+            </a:r>
+          </a:p>
+          <a:p>
+            <a:r>
+              <a:rPr lang="en-US" sz="1600" dirty="0" smtClean="0">
+                <a:latin typeface="Consolas" pitchFamily="49" charset="0"/>
+                <a:cs typeface="Consolas" pitchFamily="49" charset="0"/>
+              </a:rPr>
+              <a:t>}</a:t>
+            </a:r>
+            <a:endParaRPr lang="en-US" sz="1600" dirty="0">
+              <a:latin typeface="Consolas" pitchFamily="49" charset="0"/>
+              <a:cs typeface="Consolas" pitchFamily="49" charset="0"/>
+            </a:endParaRPr>
           </a:p>
         </p:txBody>
       </p:sp>
@@ -5113,7 +5305,7 @@
           <a:p>
             <a:r>
               <a:rPr lang="en-US" dirty="0" smtClean="0"/>
-              <a:t>Component Disposal</a:t>
+              <a:t>Component Disposal (cont.)</a:t>
             </a:r>
             <a:endParaRPr lang="en-US" dirty="0"/>
           </a:p>
@@ -5129,254 +5321,49 @@
             <p:ph idx="1"/>
           </p:nvPr>
         </p:nvSpPr>
-        <p:spPr>
-          <a:xfrm>
-            <a:off x="457200" y="1600200"/>
-            <a:ext cx="8305800" cy="4525963"/>
-          </a:xfrm>
-        </p:spPr>
-        <p:txBody>
-          <a:bodyPr>
-            <a:normAutofit/>
-          </a:bodyPr>
+        <p:spPr/>
+        <p:txBody>
+          <a:bodyPr/>
           <a:lstStyle/>
           <a:p>
             <a:r>
               <a:rPr lang="en-US" dirty="0" smtClean="0"/>
-              <a:t>This is hard.</a:t>
-            </a:r>
-          </a:p>
-          <a:p>
+              <a:t>Given that a Ninja was provided by an </a:t>
+            </a:r>
+            <a:r>
+              <a:rPr lang="en-US" dirty="0" err="1" smtClean="0"/>
+              <a:t>IoC</a:t>
+            </a:r>
             <a:r>
               <a:rPr lang="en-US" dirty="0" smtClean="0"/>
-              <a:t>Rule of disposal</a:t>
+              <a:t> container, how does it get disposed?</a:t>
+            </a:r>
+          </a:p>
+          <a:p>
+            <a:r>
+              <a:rPr lang="en-US" dirty="0" smtClean="0"/>
+              <a:t>Windsor provides a release method.</a:t>
             </a:r>
           </a:p>
           <a:p>
             <a:pPr lvl="1"/>
             <a:r>
               <a:rPr lang="en-US" dirty="0" smtClean="0"/>
-              <a:t> implement </a:t>
-            </a:r>
+              <a:t>It keeps track of all the dependencies that were instantiated down the line and then walks it back, disposing of them as necessary.</a:t>
+            </a:r>
+          </a:p>
+          <a:p>
             <a:r>
               <a:rPr lang="en-US" dirty="0" err="1" smtClean="0"/>
-              <a:t>IDisposable</a:t>
+              <a:t>Autofac</a:t>
             </a:r>
             <a:r>
               <a:rPr lang="en-US" dirty="0" smtClean="0"/>
-              <a:t> when the class </a:t>
-            </a:r>
-            <a:r>
-              <a:rPr lang="en-US" b="1" i="1" u="sng" dirty="0" smtClean="0"/>
-              <a:t>owns</a:t>
-            </a:r>
-            <a:r>
-              <a:rPr lang="en-US" dirty="0" smtClean="0"/>
-              <a:t> an unmanaged resource and/or another class that implements </a:t>
-            </a:r>
-            <a:r>
-              <a:rPr lang="en-US" dirty="0" err="1" smtClean="0"/>
-              <a:t>IDisposable</a:t>
-            </a:r>
-            <a:r>
-              <a:rPr lang="en-US" dirty="0" smtClean="0"/>
-              <a:t>.</a:t>
-            </a:r>
-          </a:p>
-          <a:p>
-            <a:pPr lvl="1"/>
-            <a:endParaRPr lang="en-US" dirty="0" smtClean="0"/>
-          </a:p>
-          <a:p>
-            <a:pPr lvl="1"/>
-            <a:endParaRPr lang="en-US" dirty="0" smtClean="0"/>
-          </a:p>
-        </p:txBody>
-      </p:sp>
-      <p:sp>
-        <p:nvSpPr>
-          <p:cNvPr id="4" name="TextBox 3"/>
-          <p:cNvSpPr txBox="1"/>
-          <p:nvPr/>
-        </p:nvSpPr>
-        <p:spPr>
-          <a:xfrm>
-            <a:off x="533400" y="4191000"/>
-            <a:ext cx="4191000" cy="2062103"/>
-          </a:xfrm>
-          <a:prstGeom prst="rect">
-            <a:avLst/>
-          </a:prstGeom>
-          <a:noFill/>
-        </p:spPr>
-        <p:txBody>
-          <a:bodyPr wrap="square" rtlCol="0">
-            <a:spAutoFit/>
-          </a:bodyPr>
-          <a:lstStyle/>
-          <a:p>
-            <a:r>
-              <a:rPr lang="en-US" sz="1600" dirty="0" smtClean="0">
-                <a:latin typeface="Consolas" pitchFamily="49" charset="0"/>
-                <a:cs typeface="Consolas" pitchFamily="49" charset="0"/>
-              </a:rPr>
-              <a:t>public class Ninja</a:t>
-            </a:r>
-          </a:p>
-          <a:p>
-            <a:r>
-              <a:rPr lang="en-US" sz="1600" dirty="0" smtClean="0">
-                <a:latin typeface="Consolas" pitchFamily="49" charset="0"/>
-                <a:cs typeface="Consolas" pitchFamily="49" charset="0"/>
-              </a:rPr>
-              <a:t>{</a:t>
-            </a:r>
-          </a:p>
-          <a:p>
-            <a:r>
-              <a:rPr lang="en-US" sz="1600" dirty="0" smtClean="0">
-                <a:latin typeface="Consolas" pitchFamily="49" charset="0"/>
-                <a:cs typeface="Consolas" pitchFamily="49" charset="0"/>
-              </a:rPr>
-              <a:t>  private Pirate _prisoner;</a:t>
-            </a:r>
-          </a:p>
-          <a:p>
-            <a:r>
-              <a:rPr lang="en-US" sz="1600" dirty="0" smtClean="0">
-                <a:latin typeface="Consolas" pitchFamily="49" charset="0"/>
-                <a:cs typeface="Consolas" pitchFamily="49" charset="0"/>
-              </a:rPr>
-              <a:t>  public Ninja(Pirate prisoner) </a:t>
-            </a:r>
-          </a:p>
-          <a:p>
-            <a:r>
-              <a:rPr lang="en-US" sz="1600" dirty="0" smtClean="0">
-                <a:latin typeface="Consolas" pitchFamily="49" charset="0"/>
-                <a:cs typeface="Consolas" pitchFamily="49" charset="0"/>
-              </a:rPr>
-              <a:t>  {</a:t>
-            </a:r>
-          </a:p>
-          <a:p>
-            <a:r>
-              <a:rPr lang="en-US" sz="1600" dirty="0" smtClean="0">
-                <a:latin typeface="Consolas" pitchFamily="49" charset="0"/>
-                <a:cs typeface="Consolas" pitchFamily="49" charset="0"/>
-              </a:rPr>
-              <a:t>     _prisoner = prisoner;</a:t>
-            </a:r>
-            <a:endParaRPr lang="en-US" sz="1600" dirty="0">
-              <a:latin typeface="Consolas" pitchFamily="49" charset="0"/>
-              <a:cs typeface="Consolas" pitchFamily="49" charset="0"/>
-            </a:endParaRPr>
-          </a:p>
-          <a:p>
-            <a:r>
-              <a:rPr lang="en-US" sz="1600" dirty="0">
-                <a:latin typeface="Consolas" pitchFamily="49" charset="0"/>
-                <a:cs typeface="Consolas" pitchFamily="49" charset="0"/>
-              </a:rPr>
-              <a:t> </a:t>
-            </a:r>
-            <a:r>
-              <a:rPr lang="en-US" sz="1600" dirty="0" smtClean="0">
-                <a:latin typeface="Consolas" pitchFamily="49" charset="0"/>
-                <a:cs typeface="Consolas" pitchFamily="49" charset="0"/>
-              </a:rPr>
-              <a:t> }</a:t>
-            </a:r>
-          </a:p>
-          <a:p>
-            <a:r>
-              <a:rPr lang="en-US" sz="1600" dirty="0">
-                <a:latin typeface="Consolas" pitchFamily="49" charset="0"/>
-                <a:cs typeface="Consolas" pitchFamily="49" charset="0"/>
-              </a:rPr>
-              <a:t>}</a:t>
-            </a:r>
-          </a:p>
-        </p:txBody>
-      </p:sp>
-      <p:sp>
-        <p:nvSpPr>
-          <p:cNvPr id="5" name="TextBox 4"/>
-          <p:cNvSpPr txBox="1"/>
-          <p:nvPr/>
-        </p:nvSpPr>
-        <p:spPr>
-          <a:xfrm>
-            <a:off x="4419600" y="4191000"/>
-            <a:ext cx="4191000" cy="1077218"/>
-          </a:xfrm>
-          <a:prstGeom prst="rect">
-            <a:avLst/>
-          </a:prstGeom>
-          <a:noFill/>
-        </p:spPr>
-        <p:txBody>
-          <a:bodyPr wrap="square" rtlCol="0">
-            <a:spAutoFit/>
-          </a:bodyPr>
-          <a:lstStyle/>
-          <a:p>
-            <a:r>
-              <a:rPr lang="en-US" sz="1600" dirty="0" smtClean="0">
-                <a:latin typeface="Consolas" pitchFamily="49" charset="0"/>
-                <a:cs typeface="Consolas" pitchFamily="49" charset="0"/>
-              </a:rPr>
-              <a:t>public class Pirate : </a:t>
-            </a:r>
-            <a:r>
-              <a:rPr lang="en-US" sz="1600" dirty="0" err="1" smtClean="0">
-                <a:latin typeface="Consolas" pitchFamily="49" charset="0"/>
-                <a:cs typeface="Consolas" pitchFamily="49" charset="0"/>
-              </a:rPr>
-              <a:t>IDisposable</a:t>
-            </a:r>
-            <a:endParaRPr lang="en-US" sz="1600" dirty="0" smtClean="0">
-              <a:latin typeface="Consolas" pitchFamily="49" charset="0"/>
-              <a:cs typeface="Consolas" pitchFamily="49" charset="0"/>
-            </a:endParaRPr>
-          </a:p>
-          <a:p>
-            <a:r>
-              <a:rPr lang="en-US" sz="1600" dirty="0" smtClean="0">
-                <a:latin typeface="Consolas" pitchFamily="49" charset="0"/>
-                <a:cs typeface="Consolas" pitchFamily="49" charset="0"/>
-              </a:rPr>
-              <a:t>{</a:t>
-            </a:r>
-          </a:p>
-          <a:p>
-            <a:r>
-              <a:rPr lang="en-US" sz="1600" dirty="0">
-                <a:latin typeface="Consolas" pitchFamily="49" charset="0"/>
-                <a:cs typeface="Consolas" pitchFamily="49" charset="0"/>
-              </a:rPr>
-              <a:t> </a:t>
-            </a:r>
-            <a:r>
-              <a:rPr lang="en-US" sz="1600" dirty="0" smtClean="0">
-                <a:latin typeface="Consolas" pitchFamily="49" charset="0"/>
-                <a:cs typeface="Consolas" pitchFamily="49" charset="0"/>
-              </a:rPr>
-              <a:t> //…</a:t>
-            </a:r>
-          </a:p>
-          <a:p>
-            <a:r>
-              <a:rPr lang="en-US" sz="1600" dirty="0" smtClean="0">
-                <a:latin typeface="Consolas" pitchFamily="49" charset="0"/>
-                <a:cs typeface="Consolas" pitchFamily="49" charset="0"/>
-              </a:rPr>
-              <a:t>}</a:t>
-            </a:r>
-            <a:endParaRPr lang="en-US" sz="1600" dirty="0">
-              <a:latin typeface="Consolas" pitchFamily="49" charset="0"/>
-              <a:cs typeface="Consolas" pitchFamily="49" charset="0"/>
-            </a:endParaRPr>
+              <a:t> uses scopes to handle disposal.</a:t>
+            </a:r>
+          </a:p>
+          <a:p>
+            <a:endParaRPr lang="en-US" dirty="0"/>
           </a:p>
         </p:txBody>
       </p:sp>

</xml_diff>

<commit_message>
add stages into source
</commit_message>
<xml_diff>
--- a/BuildYourOwnIoC/Build Your Own Ioc Container.pptx
+++ b/BuildYourOwnIoC/Build Your Own Ioc Container.pptx
@@ -5,7 +5,7 @@
     <p:sldMasterId id="2147483660" r:id="rId1"/>
   </p:sldMasterIdLst>
   <p:notesMasterIdLst>
-    <p:notesMasterId r:id="rId12"/>
+    <p:notesMasterId r:id="rId13"/>
   </p:notesMasterIdLst>
   <p:sldIdLst>
     <p:sldId id="256" r:id="rId2"/>
@@ -18,6 +18,7 @@
     <p:sldId id="264" r:id="rId9"/>
     <p:sldId id="265" r:id="rId10"/>
     <p:sldId id="267" r:id="rId11"/>
+    <p:sldId id="270" r:id="rId12"/>
   </p:sldIdLst>
   <p:sldSz cx="9144000" cy="6858000" type="screen4x3"/>
   <p:notesSz cx="6858000" cy="9144000"/>
@@ -201,7 +202,7 @@
           <a:p>
             <a:fld id="{EC34E648-8457-48F2-B6CA-95B1DA475DC5}" type="datetimeFigureOut">
               <a:rPr lang="en-US" smtClean="0"/>
-              <a:t>3/4/2011</a:t>
+              <a:t>3/5/2011</a:t>
             </a:fld>
             <a:endParaRPr lang="en-US"/>
           </a:p>
@@ -1025,7 +1026,7 @@
           <a:p>
             <a:fld id="{691F226E-D6F6-4011-BB9D-84620BFBE5B3}" type="datetimeFigureOut">
               <a:rPr lang="en-US" smtClean="0"/>
-              <a:t>3/4/2011</a:t>
+              <a:t>3/5/2011</a:t>
             </a:fld>
             <a:endParaRPr lang="en-US"/>
           </a:p>
@@ -1190,7 +1191,7 @@
           <a:p>
             <a:fld id="{691F226E-D6F6-4011-BB9D-84620BFBE5B3}" type="datetimeFigureOut">
               <a:rPr lang="en-US" smtClean="0"/>
-              <a:t>3/4/2011</a:t>
+              <a:t>3/5/2011</a:t>
             </a:fld>
             <a:endParaRPr lang="en-US"/>
           </a:p>
@@ -1365,7 +1366,7 @@
           <a:p>
             <a:fld id="{691F226E-D6F6-4011-BB9D-84620BFBE5B3}" type="datetimeFigureOut">
               <a:rPr lang="en-US" smtClean="0"/>
-              <a:t>3/4/2011</a:t>
+              <a:t>3/5/2011</a:t>
             </a:fld>
             <a:endParaRPr lang="en-US"/>
           </a:p>
@@ -1534,7 +1535,7 @@
           <a:p>
             <a:fld id="{691F226E-D6F6-4011-BB9D-84620BFBE5B3}" type="datetimeFigureOut">
               <a:rPr lang="en-US" smtClean="0"/>
-              <a:t>3/4/2011</a:t>
+              <a:t>3/5/2011</a:t>
             </a:fld>
             <a:endParaRPr lang="en-US"/>
           </a:p>
@@ -1989,7 +1990,7 @@
           <a:p>
             <a:fld id="{691F226E-D6F6-4011-BB9D-84620BFBE5B3}" type="datetimeFigureOut">
               <a:rPr lang="en-US" smtClean="0"/>
-              <a:t>3/4/2011</a:t>
+              <a:t>3/5/2011</a:t>
             </a:fld>
             <a:endParaRPr lang="en-US"/>
           </a:p>
@@ -2253,7 +2254,7 @@
           <a:p>
             <a:fld id="{691F226E-D6F6-4011-BB9D-84620BFBE5B3}" type="datetimeFigureOut">
               <a:rPr lang="en-US" smtClean="0"/>
-              <a:t>3/4/2011</a:t>
+              <a:t>3/5/2011</a:t>
             </a:fld>
             <a:endParaRPr lang="en-US"/>
           </a:p>
@@ -2627,7 +2628,7 @@
           <a:p>
             <a:fld id="{691F226E-D6F6-4011-BB9D-84620BFBE5B3}" type="datetimeFigureOut">
               <a:rPr lang="en-US" smtClean="0"/>
-              <a:t>3/4/2011</a:t>
+              <a:t>3/5/2011</a:t>
             </a:fld>
             <a:endParaRPr lang="en-US"/>
           </a:p>
@@ -2749,7 +2750,7 @@
           <a:p>
             <a:fld id="{691F226E-D6F6-4011-BB9D-84620BFBE5B3}" type="datetimeFigureOut">
               <a:rPr lang="en-US" smtClean="0"/>
-              <a:t>3/4/2011</a:t>
+              <a:t>3/5/2011</a:t>
             </a:fld>
             <a:endParaRPr lang="en-US"/>
           </a:p>
@@ -2839,7 +2840,7 @@
           <a:p>
             <a:fld id="{691F226E-D6F6-4011-BB9D-84620BFBE5B3}" type="datetimeFigureOut">
               <a:rPr lang="en-US" smtClean="0"/>
-              <a:t>3/4/2011</a:t>
+              <a:t>3/5/2011</a:t>
             </a:fld>
             <a:endParaRPr lang="en-US"/>
           </a:p>
@@ -3088,7 +3089,7 @@
           <a:p>
             <a:fld id="{691F226E-D6F6-4011-BB9D-84620BFBE5B3}" type="datetimeFigureOut">
               <a:rPr lang="en-US" smtClean="0"/>
-              <a:t>3/4/2011</a:t>
+              <a:t>3/5/2011</a:t>
             </a:fld>
             <a:endParaRPr lang="en-US"/>
           </a:p>
@@ -3347,7 +3348,7 @@
           <a:p>
             <a:fld id="{691F226E-D6F6-4011-BB9D-84620BFBE5B3}" type="datetimeFigureOut">
               <a:rPr lang="en-US" smtClean="0"/>
-              <a:t>3/4/2011</a:t>
+              <a:t>3/5/2011</a:t>
             </a:fld>
             <a:endParaRPr lang="en-US"/>
           </a:p>
@@ -3751,7 +3752,7 @@
           <a:p>
             <a:fld id="{691F226E-D6F6-4011-BB9D-84620BFBE5B3}" type="datetimeFigureOut">
               <a:rPr lang="en-US" smtClean="0"/>
-              <a:t>3/4/2011</a:t>
+              <a:t>3/5/2011</a:t>
             </a:fld>
             <a:endParaRPr lang="en-US"/>
           </a:p>
@@ -4203,15 +4204,7 @@
             </a:r>
             <a:r>
               <a:rPr lang="en-US" dirty="0" smtClean="0"/>
-              <a:t>ecause </a:t>
-            </a:r>
-            <a:r>
-              <a:rPr lang="en-US" dirty="0" smtClean="0"/>
-              <a:t>we </a:t>
-            </a:r>
-            <a:r>
-              <a:rPr lang="en-US" dirty="0" smtClean="0"/>
-              <a:t>can, not because we should.</a:t>
+              <a:t>ecause we can, not because we should.</a:t>
             </a:r>
             <a:endParaRPr lang="en-US" dirty="0"/>
           </a:p>
@@ -4292,12 +4285,105 @@
           <a:p>
             <a:r>
               <a:rPr lang="en-US" dirty="0" smtClean="0"/>
-              <a:t>Proxy support</a:t>
-            </a:r>
+              <a:t>Proxy </a:t>
+            </a:r>
+            <a:r>
+              <a:rPr lang="en-US" dirty="0" smtClean="0"/>
+              <a:t>support</a:t>
+            </a:r>
+          </a:p>
+          <a:p>
+            <a:r>
+              <a:rPr lang="en-US" dirty="0" smtClean="0"/>
+              <a:t>Child Containers</a:t>
+            </a:r>
+            <a:endParaRPr lang="en-US" dirty="0" smtClean="0"/>
           </a:p>
         </p:txBody>
       </p:sp>
     </p:spTree>
+  </p:cSld>
+  <p:clrMapOvr>
+    <a:masterClrMapping/>
+  </p:clrMapOvr>
+</p:sld>
+</file>
+
+<file path=ppt/slides/slide11.xml><?xml version="1.0" encoding="utf-8"?>
+<p:sld xmlns:a="http://schemas.openxmlformats.org/drawingml/2006/main" xmlns:r="http://schemas.openxmlformats.org/officeDocument/2006/relationships" xmlns:p="http://schemas.openxmlformats.org/presentationml/2006/main">
+  <p:cSld>
+    <p:spTree>
+      <p:nvGrpSpPr>
+        <p:cNvPr id="1" name=""/>
+        <p:cNvGrpSpPr/>
+        <p:nvPr/>
+      </p:nvGrpSpPr>
+      <p:grpSpPr>
+        <a:xfrm>
+          <a:off x="0" y="0"/>
+          <a:ext cx="0" cy="0"/>
+          <a:chOff x="0" y="0"/>
+          <a:chExt cx="0" cy="0"/>
+        </a:xfrm>
+      </p:grpSpPr>
+      <p:sp>
+        <p:nvSpPr>
+          <p:cNvPr id="2" name="Title 1"/>
+          <p:cNvSpPr>
+            <a:spLocks noGrp="1"/>
+          </p:cNvSpPr>
+          <p:nvPr>
+            <p:ph type="title"/>
+          </p:nvPr>
+        </p:nvSpPr>
+        <p:spPr/>
+        <p:txBody>
+          <a:bodyPr/>
+          <a:lstStyle/>
+          <a:p>
+            <a:r>
+              <a:rPr lang="en-US" dirty="0" smtClean="0"/>
+              <a:t>Contact Info</a:t>
+            </a:r>
+            <a:endParaRPr lang="en-US" dirty="0"/>
+          </a:p>
+        </p:txBody>
+      </p:sp>
+      <p:sp>
+        <p:nvSpPr>
+          <p:cNvPr id="3" name="Content Placeholder 2"/>
+          <p:cNvSpPr>
+            <a:spLocks noGrp="1"/>
+          </p:cNvSpPr>
+          <p:nvPr>
+            <p:ph idx="1"/>
+          </p:nvPr>
+        </p:nvSpPr>
+        <p:spPr/>
+        <p:txBody>
+          <a:bodyPr/>
+          <a:lstStyle/>
+          <a:p>
+            <a:r>
+              <a:rPr lang="en-US" dirty="0" smtClean="0"/>
+              <a:t>craiggwilson@gmail.com</a:t>
+            </a:r>
+          </a:p>
+          <a:p>
+            <a:r>
+              <a:rPr lang="en-US" dirty="0" smtClean="0"/>
+              <a:t>http://github.com/craiggwilson</a:t>
+            </a:r>
+            <a:endParaRPr lang="en-US" dirty="0"/>
+          </a:p>
+        </p:txBody>
+      </p:sp>
+    </p:spTree>
+    <p:extLst>
+      <p:ext uri="{BB962C8B-B14F-4D97-AF65-F5344CB8AC3E}">
+        <p14:creationId xmlns:p14="http://schemas.microsoft.com/office/powerpoint/2010/main" val="2606933271"/>
+      </p:ext>
+    </p:extLst>
   </p:cSld>
   <p:clrMapOvr>
     <a:masterClrMapping/>
@@ -4495,13 +4581,8 @@
           <a:p>
             <a:r>
               <a:rPr lang="en-US" dirty="0" smtClean="0"/>
-              <a:t>An enabler of the </a:t>
-            </a:r>
-            <a:r>
-              <a:rPr lang="en-US" dirty="0" smtClean="0"/>
-              <a:t>D in SOLID</a:t>
-            </a:r>
-            <a:endParaRPr lang="en-US" dirty="0" smtClean="0"/>
+              <a:t>An enabler of the D in SOLID</a:t>
+            </a:r>
           </a:p>
           <a:p>
             <a:pPr lvl="1"/>
@@ -4513,11 +4594,7 @@
           <a:p>
             <a:r>
               <a:rPr lang="en-US" dirty="0" smtClean="0"/>
-              <a:t>Moves </a:t>
-            </a:r>
-            <a:r>
-              <a:rPr lang="en-US" dirty="0" smtClean="0"/>
-              <a:t>the responsibility of creating dependencies from a low-level component to a high-level component.</a:t>
+              <a:t>Moves the responsibility of creating dependencies from a low-level component to a high-level component.</a:t>
             </a:r>
           </a:p>
           <a:p>
@@ -4623,11 +4700,7 @@
           <a:p>
             <a:r>
               <a:rPr lang="en-US" dirty="0" smtClean="0"/>
-              <a:t>Property </a:t>
-            </a:r>
-            <a:r>
-              <a:rPr lang="en-US" dirty="0" smtClean="0"/>
-              <a:t>Injection</a:t>
+              <a:t>Property Injection</a:t>
             </a:r>
           </a:p>
           <a:p>
@@ -4813,11 +4886,7 @@
           <a:p>
             <a:r>
               <a:rPr lang="en-US" dirty="0" smtClean="0"/>
-              <a:t>Coding </a:t>
-            </a:r>
-            <a:r>
-              <a:rPr lang="en-US" dirty="0" smtClean="0"/>
-              <a:t>Goal</a:t>
+              <a:t>Coding Goal</a:t>
             </a:r>
             <a:endParaRPr lang="en-US" dirty="0"/>
           </a:p>
@@ -4878,7 +4947,6 @@
               <a:rPr lang="en-US" dirty="0" smtClean="0"/>
               <a:t>Circular Dependencies</a:t>
             </a:r>
-            <a:endParaRPr lang="en-US" dirty="0" smtClean="0"/>
           </a:p>
         </p:txBody>
       </p:sp>

</xml_diff>